<commit_message>
updated diagram with new wording
updated diagram with new wording: collection => catalog
</commit_message>
<xml_diff>
--- a/design/NetLearner.pptx
+++ b/design/NetLearner.pptx
@@ -5,13 +5,14 @@
     <p:sldMasterId id="2147483648" r:id="rId1"/>
   </p:sldMasterIdLst>
   <p:notesMasterIdLst>
-    <p:notesMasterId r:id="rId6"/>
+    <p:notesMasterId r:id="rId7"/>
   </p:notesMasterIdLst>
   <p:sldIdLst>
     <p:sldId id="256" r:id="rId2"/>
     <p:sldId id="257" r:id="rId3"/>
     <p:sldId id="258" r:id="rId4"/>
     <p:sldId id="259" r:id="rId5"/>
+    <p:sldId id="260" r:id="rId6"/>
   </p:sldIdLst>
   <p:sldSz cx="12192000" cy="6858000"/>
   <p:notesSz cx="6858000" cy="9144000"/>
@@ -212,7 +213,7 @@
           <a:p>
             <a:fld id="{8A983A72-1704-4B9A-9708-0EB61AEA5B44}" type="datetimeFigureOut">
               <a:rPr lang="en-US" smtClean="0"/>
-              <a:t>1/31/2019</a:t>
+              <a:t>2/3/2019</a:t>
             </a:fld>
             <a:endParaRPr lang="en-US"/>
           </a:p>
@@ -962,7 +963,7 @@
           <a:p>
             <a:fld id="{59F7FEC8-600F-4E61-A2F6-C191493E2F20}" type="datetimeFigureOut">
               <a:rPr lang="en-US" smtClean="0"/>
-              <a:t>1/31/2019</a:t>
+              <a:t>2/3/2019</a:t>
             </a:fld>
             <a:endParaRPr lang="en-US"/>
           </a:p>
@@ -1160,7 +1161,7 @@
           <a:p>
             <a:fld id="{59F7FEC8-600F-4E61-A2F6-C191493E2F20}" type="datetimeFigureOut">
               <a:rPr lang="en-US" smtClean="0"/>
-              <a:t>1/31/2019</a:t>
+              <a:t>2/3/2019</a:t>
             </a:fld>
             <a:endParaRPr lang="en-US"/>
           </a:p>
@@ -1368,7 +1369,7 @@
           <a:p>
             <a:fld id="{59F7FEC8-600F-4E61-A2F6-C191493E2F20}" type="datetimeFigureOut">
               <a:rPr lang="en-US" smtClean="0"/>
-              <a:t>1/31/2019</a:t>
+              <a:t>2/3/2019</a:t>
             </a:fld>
             <a:endParaRPr lang="en-US"/>
           </a:p>
@@ -1566,7 +1567,7 @@
           <a:p>
             <a:fld id="{59F7FEC8-600F-4E61-A2F6-C191493E2F20}" type="datetimeFigureOut">
               <a:rPr lang="en-US" smtClean="0"/>
-              <a:t>1/31/2019</a:t>
+              <a:t>2/3/2019</a:t>
             </a:fld>
             <a:endParaRPr lang="en-US"/>
           </a:p>
@@ -1841,7 +1842,7 @@
           <a:p>
             <a:fld id="{59F7FEC8-600F-4E61-A2F6-C191493E2F20}" type="datetimeFigureOut">
               <a:rPr lang="en-US" smtClean="0"/>
-              <a:t>1/31/2019</a:t>
+              <a:t>2/3/2019</a:t>
             </a:fld>
             <a:endParaRPr lang="en-US"/>
           </a:p>
@@ -2106,7 +2107,7 @@
           <a:p>
             <a:fld id="{59F7FEC8-600F-4E61-A2F6-C191493E2F20}" type="datetimeFigureOut">
               <a:rPr lang="en-US" smtClean="0"/>
-              <a:t>1/31/2019</a:t>
+              <a:t>2/3/2019</a:t>
             </a:fld>
             <a:endParaRPr lang="en-US"/>
           </a:p>
@@ -2518,7 +2519,7 @@
           <a:p>
             <a:fld id="{59F7FEC8-600F-4E61-A2F6-C191493E2F20}" type="datetimeFigureOut">
               <a:rPr lang="en-US" smtClean="0"/>
-              <a:t>1/31/2019</a:t>
+              <a:t>2/3/2019</a:t>
             </a:fld>
             <a:endParaRPr lang="en-US"/>
           </a:p>
@@ -2659,7 +2660,7 @@
           <a:p>
             <a:fld id="{59F7FEC8-600F-4E61-A2F6-C191493E2F20}" type="datetimeFigureOut">
               <a:rPr lang="en-US" smtClean="0"/>
-              <a:t>1/31/2019</a:t>
+              <a:t>2/3/2019</a:t>
             </a:fld>
             <a:endParaRPr lang="en-US"/>
           </a:p>
@@ -2772,7 +2773,7 @@
           <a:p>
             <a:fld id="{59F7FEC8-600F-4E61-A2F6-C191493E2F20}" type="datetimeFigureOut">
               <a:rPr lang="en-US" smtClean="0"/>
-              <a:t>1/31/2019</a:t>
+              <a:t>2/3/2019</a:t>
             </a:fld>
             <a:endParaRPr lang="en-US"/>
           </a:p>
@@ -3083,7 +3084,7 @@
           <a:p>
             <a:fld id="{59F7FEC8-600F-4E61-A2F6-C191493E2F20}" type="datetimeFigureOut">
               <a:rPr lang="en-US" smtClean="0"/>
-              <a:t>1/31/2019</a:t>
+              <a:t>2/3/2019</a:t>
             </a:fld>
             <a:endParaRPr lang="en-US"/>
           </a:p>
@@ -3371,7 +3372,7 @@
           <a:p>
             <a:fld id="{59F7FEC8-600F-4E61-A2F6-C191493E2F20}" type="datetimeFigureOut">
               <a:rPr lang="en-US" smtClean="0"/>
-              <a:t>1/31/2019</a:t>
+              <a:t>2/3/2019</a:t>
             </a:fld>
             <a:endParaRPr lang="en-US"/>
           </a:p>
@@ -3612,7 +3613,7 @@
           <a:p>
             <a:fld id="{59F7FEC8-600F-4E61-A2F6-C191493E2F20}" type="datetimeFigureOut">
               <a:rPr lang="en-US" smtClean="0"/>
-              <a:t>1/31/2019</a:t>
+              <a:t>2/3/2019</a:t>
             </a:fld>
             <a:endParaRPr lang="en-US"/>
           </a:p>
@@ -4219,7 +4220,7 @@
                   <a:srgbClr val="FF0000"/>
                 </a:solidFill>
               </a:rPr>
-              <a:t>Collection</a:t>
+              <a:t>Catalog</a:t>
             </a:r>
           </a:p>
           <a:p>
@@ -5472,7 +5473,7 @@
           <a:p>
             <a:r>
               <a:rPr lang="en-US" dirty="0"/>
-              <a:t>Collection (Hierarchy)</a:t>
+              <a:t>Catalog (Hierarchy)</a:t>
             </a:r>
           </a:p>
           <a:p>
@@ -5832,7 +5833,7 @@
           <a:p>
             <a:r>
               <a:rPr lang="en-US" dirty="0"/>
-              <a:t>ASP .NET Core Collections</a:t>
+              <a:t>ASP .NET Core Catalogs</a:t>
             </a:r>
           </a:p>
           <a:p>
@@ -6087,7 +6088,7 @@
             </a:pPr>
             <a:r>
               <a:rPr lang="en-US" dirty="0"/>
-              <a:t>Collections | Items | Blogs | Videos | </a:t>
+              <a:t>Catalogs | Items | Blogs | Videos | </a:t>
             </a:r>
             <a:r>
               <a:rPr lang="en-US" dirty="0" err="1"/>
@@ -6294,7 +6295,7 @@
           <a:p>
             <a:r>
               <a:rPr lang="en-US" dirty="0"/>
-              <a:t>ASP .NET Core Collections</a:t>
+              <a:t>ASP .NET Core Catalogs</a:t>
             </a:r>
           </a:p>
           <a:p>
@@ -6347,6 +6348,72 @@
     <p:extLst>
       <p:ext uri="{BB962C8B-B14F-4D97-AF65-F5344CB8AC3E}">
         <p14:creationId xmlns:p14="http://schemas.microsoft.com/office/powerpoint/2010/main" val="3468129582"/>
+      </p:ext>
+    </p:extLst>
+  </p:cSld>
+  <p:clrMapOvr>
+    <a:masterClrMapping/>
+  </p:clrMapOvr>
+</p:sld>
+</file>
+
+<file path=ppt/slides/slide5.xml><?xml version="1.0" encoding="utf-8"?>
+<p:sld xmlns:a="http://schemas.openxmlformats.org/drawingml/2006/main" xmlns:r="http://schemas.openxmlformats.org/officeDocument/2006/relationships" xmlns:p="http://schemas.openxmlformats.org/presentationml/2006/main">
+  <p:cSld>
+    <p:spTree>
+      <p:nvGrpSpPr>
+        <p:cNvPr id="1" name=""/>
+        <p:cNvGrpSpPr/>
+        <p:nvPr/>
+      </p:nvGrpSpPr>
+      <p:grpSpPr>
+        <a:xfrm>
+          <a:off x="0" y="0"/>
+          <a:ext cx="0" cy="0"/>
+          <a:chOff x="0" y="0"/>
+          <a:chExt cx="0" cy="0"/>
+        </a:xfrm>
+      </p:grpSpPr>
+      <p:pic>
+        <p:nvPicPr>
+          <p:cNvPr id="5" name="Picture 4" descr="A screenshot of a social media post&#10;&#10;Description automatically generated">
+            <a:extLst>
+              <a:ext uri="{FF2B5EF4-FFF2-40B4-BE49-F238E27FC236}">
+                <a16:creationId xmlns:a16="http://schemas.microsoft.com/office/drawing/2014/main" id="{81A204C3-47AB-41F2-AC0E-B9A0BB337AA5}"/>
+              </a:ext>
+            </a:extLst>
+          </p:cNvPr>
+          <p:cNvPicPr>
+            <a:picLocks noChangeAspect="1"/>
+          </p:cNvPicPr>
+          <p:nvPr/>
+        </p:nvPicPr>
+        <p:blipFill>
+          <a:blip r:embed="rId2">
+            <a:extLst>
+              <a:ext uri="{28A0092B-C50C-407E-A947-70E740481C1C}">
+                <a14:useLocalDpi xmlns:a14="http://schemas.microsoft.com/office/drawing/2010/main" val="0"/>
+              </a:ext>
+            </a:extLst>
+          </a:blip>
+          <a:stretch>
+            <a:fillRect/>
+          </a:stretch>
+        </p:blipFill>
+        <p:spPr>
+          <a:xfrm>
+            <a:off x="2587149" y="0"/>
+            <a:ext cx="7017701" cy="6858000"/>
+          </a:xfrm>
+          <a:prstGeom prst="rect">
+            <a:avLst/>
+          </a:prstGeom>
+        </p:spPr>
+      </p:pic>
+    </p:spTree>
+    <p:extLst>
+      <p:ext uri="{BB962C8B-B14F-4D97-AF65-F5344CB8AC3E}">
+        <p14:creationId xmlns:p14="http://schemas.microsoft.com/office/powerpoint/2010/main" val="244499100"/>
       </p:ext>
     </p:extLst>
   </p:cSld>

</xml_diff>